<commit_message>
saved in progress ppt
</commit_message>
<xml_diff>
--- a/papers/20210518_Tag up with Julian.pptx
+++ b/papers/20210518_Tag up with Julian.pptx
@@ -4810,30 +4810,50 @@
           <a:p>
             <a:r>
               <a:rPr lang="en-US" dirty="0"/>
-              <a:t>Can I do a mixing model to ID pumpkin seed invertebrate diet?  Short answer </a:t>
-            </a:r>
-            <a:r>
-              <a:rPr lang="en-US"/>
-              <a:t>is no.</a:t>
-            </a:r>
+              <a:t>Can I do a mixing model to ID pumpkin seed invertebrate diet?  Short answer is no.</a:t>
+            </a:r>
+          </a:p>
+        </p:txBody>
+      </p:sp>
+      <p:sp>
+        <p:nvSpPr>
+          <p:cNvPr id="3" name="Text Placeholder 2">
+            <a:extLst>
+              <a:ext uri="{FF2B5EF4-FFF2-40B4-BE49-F238E27FC236}">
+                <a16:creationId xmlns:a16="http://schemas.microsoft.com/office/drawing/2014/main" id="{49CEE81A-432B-F447-B155-AE4418E45933}"/>
+              </a:ext>
+            </a:extLst>
+          </p:cNvPr>
+          <p:cNvSpPr>
+            <a:spLocks noGrp="1"/>
+          </p:cNvSpPr>
+          <p:nvPr>
+            <p:ph type="body" idx="1"/>
+          </p:nvPr>
+        </p:nvSpPr>
+        <p:spPr/>
+        <p:txBody>
+          <a:bodyPr/>
+          <a:lstStyle/>
+          <a:p>
             <a:endParaRPr lang="en-US" dirty="0"/>
           </a:p>
         </p:txBody>
       </p:sp>
       <p:sp>
         <p:nvSpPr>
-          <p:cNvPr id="3" name="Text Placeholder 2">
-            <a:extLst>
-              <a:ext uri="{FF2B5EF4-FFF2-40B4-BE49-F238E27FC236}">
-                <a16:creationId xmlns:a16="http://schemas.microsoft.com/office/drawing/2014/main" id="{49CEE81A-432B-F447-B155-AE4418E45933}"/>
-              </a:ext>
-            </a:extLst>
-          </p:cNvPr>
-          <p:cNvSpPr>
-            <a:spLocks noGrp="1"/>
-          </p:cNvSpPr>
-          <p:nvPr>
-            <p:ph type="body" idx="1"/>
+          <p:cNvPr id="4" name="Content Placeholder 3">
+            <a:extLst>
+              <a:ext uri="{FF2B5EF4-FFF2-40B4-BE49-F238E27FC236}">
+                <a16:creationId xmlns:a16="http://schemas.microsoft.com/office/drawing/2014/main" id="{E85AFED1-5A57-FD4E-A1C2-3A94CB1DCC5B}"/>
+              </a:ext>
+            </a:extLst>
+          </p:cNvPr>
+          <p:cNvSpPr>
+            <a:spLocks noGrp="1"/>
+          </p:cNvSpPr>
+          <p:nvPr>
+            <p:ph sz="half" idx="2"/>
           </p:nvPr>
         </p:nvSpPr>
         <p:spPr/>
@@ -4847,18 +4867,18 @@
       </p:sp>
       <p:sp>
         <p:nvSpPr>
-          <p:cNvPr id="4" name="Content Placeholder 3">
-            <a:extLst>
-              <a:ext uri="{FF2B5EF4-FFF2-40B4-BE49-F238E27FC236}">
-                <a16:creationId xmlns:a16="http://schemas.microsoft.com/office/drawing/2014/main" id="{E85AFED1-5A57-FD4E-A1C2-3A94CB1DCC5B}"/>
-              </a:ext>
-            </a:extLst>
-          </p:cNvPr>
-          <p:cNvSpPr>
-            <a:spLocks noGrp="1"/>
-          </p:cNvSpPr>
-          <p:nvPr>
-            <p:ph sz="half" idx="2"/>
+          <p:cNvPr id="5" name="Text Placeholder 4">
+            <a:extLst>
+              <a:ext uri="{FF2B5EF4-FFF2-40B4-BE49-F238E27FC236}">
+                <a16:creationId xmlns:a16="http://schemas.microsoft.com/office/drawing/2014/main" id="{236D924D-27A1-1A41-A8B6-164C66BA7644}"/>
+              </a:ext>
+            </a:extLst>
+          </p:cNvPr>
+          <p:cNvSpPr>
+            <a:spLocks noGrp="1"/>
+          </p:cNvSpPr>
+          <p:nvPr>
+            <p:ph type="body" sz="quarter" idx="3"/>
           </p:nvPr>
         </p:nvSpPr>
         <p:spPr/>
@@ -4872,18 +4892,18 @@
       </p:sp>
       <p:sp>
         <p:nvSpPr>
-          <p:cNvPr id="5" name="Text Placeholder 4">
-            <a:extLst>
-              <a:ext uri="{FF2B5EF4-FFF2-40B4-BE49-F238E27FC236}">
-                <a16:creationId xmlns:a16="http://schemas.microsoft.com/office/drawing/2014/main" id="{236D924D-27A1-1A41-A8B6-164C66BA7644}"/>
-              </a:ext>
-            </a:extLst>
-          </p:cNvPr>
-          <p:cNvSpPr>
-            <a:spLocks noGrp="1"/>
-          </p:cNvSpPr>
-          <p:nvPr>
-            <p:ph type="body" sz="quarter" idx="3"/>
+          <p:cNvPr id="6" name="Content Placeholder 5">
+            <a:extLst>
+              <a:ext uri="{FF2B5EF4-FFF2-40B4-BE49-F238E27FC236}">
+                <a16:creationId xmlns:a16="http://schemas.microsoft.com/office/drawing/2014/main" id="{FA700D6A-68D8-0244-88F5-A76AC3189065}"/>
+              </a:ext>
+            </a:extLst>
+          </p:cNvPr>
+          <p:cNvSpPr>
+            <a:spLocks noGrp="1"/>
+          </p:cNvSpPr>
+          <p:nvPr>
+            <p:ph sz="quarter" idx="4"/>
           </p:nvPr>
         </p:nvSpPr>
         <p:spPr/>
@@ -4891,32 +4911,22 @@
           <a:bodyPr/>
           <a:lstStyle/>
           <a:p>
-            <a:endParaRPr lang="en-US"/>
-          </a:p>
-        </p:txBody>
-      </p:sp>
-      <p:sp>
-        <p:nvSpPr>
-          <p:cNvPr id="6" name="Content Placeholder 5">
-            <a:extLst>
-              <a:ext uri="{FF2B5EF4-FFF2-40B4-BE49-F238E27FC236}">
-                <a16:creationId xmlns:a16="http://schemas.microsoft.com/office/drawing/2014/main" id="{FA700D6A-68D8-0244-88F5-A76AC3189065}"/>
-              </a:ext>
-            </a:extLst>
-          </p:cNvPr>
-          <p:cNvSpPr>
-            <a:spLocks noGrp="1"/>
-          </p:cNvSpPr>
-          <p:nvPr>
-            <p:ph sz="quarter" idx="4"/>
-          </p:nvPr>
-        </p:nvSpPr>
-        <p:spPr/>
-        <p:txBody>
-          <a:bodyPr/>
-          <a:lstStyle/>
-          <a:p>
-            <a:endParaRPr lang="en-US"/>
+            <a:r>
+              <a:rPr lang="en-US" dirty="0"/>
+              <a:t>But I can test trends of pumpkin seed relative to resources</a:t>
+            </a:r>
+          </a:p>
+          <a:p>
+            <a:r>
+              <a:rPr lang="en-US" dirty="0"/>
+              <a:t>I can examine littoral vs pelagic</a:t>
+            </a:r>
+          </a:p>
+          <a:p>
+            <a:r>
+              <a:rPr lang="en-US" dirty="0"/>
+              <a:t>I can do three source mixing models for this species and compare.</a:t>
+            </a:r>
           </a:p>
         </p:txBody>
       </p:sp>

</xml_diff>